<commit_message>
Documento final, implementand apresentação
Documento final, implementand apresentação
</commit_message>
<xml_diff>
--- a/ApresentacaoArmazenamento.pptx
+++ b/ApresentacaoArmazenamento.pptx
@@ -5,26 +5,25 @@
     <p:sldMasterId id="2147483672" r:id="rId2"/>
   </p:sldMasterIdLst>
   <p:notesMasterIdLst>
-    <p:notesMasterId r:id="rId17"/>
+    <p:notesMasterId r:id="rId16"/>
   </p:notesMasterIdLst>
   <p:handoutMasterIdLst>
-    <p:handoutMasterId r:id="rId18"/>
+    <p:handoutMasterId r:id="rId17"/>
   </p:handoutMasterIdLst>
   <p:sldIdLst>
     <p:sldId id="270" r:id="rId3"/>
     <p:sldId id="271" r:id="rId4"/>
     <p:sldId id="272" r:id="rId5"/>
-    <p:sldId id="273" r:id="rId6"/>
-    <p:sldId id="274" r:id="rId7"/>
-    <p:sldId id="275" r:id="rId8"/>
-    <p:sldId id="276" r:id="rId9"/>
-    <p:sldId id="277" r:id="rId10"/>
-    <p:sldId id="278" r:id="rId11"/>
-    <p:sldId id="279" r:id="rId12"/>
+    <p:sldId id="284" r:id="rId6"/>
+    <p:sldId id="273" r:id="rId7"/>
+    <p:sldId id="274" r:id="rId8"/>
+    <p:sldId id="275" r:id="rId9"/>
+    <p:sldId id="276" r:id="rId10"/>
+    <p:sldId id="277" r:id="rId11"/>
+    <p:sldId id="278" r:id="rId12"/>
     <p:sldId id="280" r:id="rId13"/>
     <p:sldId id="281" r:id="rId14"/>
-    <p:sldId id="282" r:id="rId15"/>
-    <p:sldId id="283" r:id="rId16"/>
+    <p:sldId id="283" r:id="rId15"/>
   </p:sldIdLst>
   <p:sldSz cx="12192000" cy="6858000"/>
   <p:notesSz cx="6858000" cy="9144000"/>
@@ -216,7 +215,7 @@
           <a:p>
             <a:fld id="{65700FC0-9E7A-4C53-8A3B-3C3C9A736C42}" type="datetimeFigureOut">
               <a:rPr lang="en-US" smtClean="0"/>
-              <a:t>5/17/2015</a:t>
+              <a:t>5/19/2015</a:t>
             </a:fld>
             <a:endParaRPr lang="en-US"/>
           </a:p>
@@ -381,7 +380,7 @@
           <a:p>
             <a:fld id="{8AF122B6-E47E-4A80-A9F3-23FD10D674FE}" type="datetimeFigureOut">
               <a:rPr lang="en-US" smtClean="0"/>
-              <a:t>5/17/2015</a:t>
+              <a:t>5/19/2015</a:t>
             </a:fld>
             <a:endParaRPr lang="en-US"/>
           </a:p>
@@ -692,7 +691,7 @@
             <a:fld id="{349BF3EA-1A78-4F07-BDC0-C8A1BD461199}" type="datetimeFigureOut">
               <a:rPr lang="en-US" smtClean="0"/>
               <a:pPr/>
-              <a:t>5/17/2015</a:t>
+              <a:t>5/19/2015</a:t>
             </a:fld>
             <a:endParaRPr lang="en-US"/>
           </a:p>
@@ -1053,7 +1052,7 @@
           <a:p>
             <a:fld id="{349BF3EA-1A78-4F07-BDC0-C8A1BD461199}" type="datetimeFigureOut">
               <a:rPr lang="en-US" smtClean="0"/>
-              <a:t>5/17/2015</a:t>
+              <a:t>5/19/2015</a:t>
             </a:fld>
             <a:endParaRPr lang="en-US"/>
           </a:p>
@@ -1251,7 +1250,7 @@
           <a:p>
             <a:fld id="{349BF3EA-1A78-4F07-BDC0-C8A1BD461199}" type="datetimeFigureOut">
               <a:rPr lang="en-US" smtClean="0"/>
-              <a:t>5/17/2015</a:t>
+              <a:t>5/19/2015</a:t>
             </a:fld>
             <a:endParaRPr lang="en-US"/>
           </a:p>
@@ -1499,7 +1498,7 @@
           <a:p>
             <a:fld id="{349BF3EA-1A78-4F07-BDC0-C8A1BD461199}" type="datetimeFigureOut">
               <a:rPr lang="en-US" smtClean="0"/>
-              <a:t>5/17/2015</a:t>
+              <a:t>5/19/2015</a:t>
             </a:fld>
             <a:endParaRPr lang="en-US"/>
           </a:p>
@@ -1770,7 +1769,7 @@
           <a:p>
             <a:fld id="{349BF3EA-1A78-4F07-BDC0-C8A1BD461199}" type="datetimeFigureOut">
               <a:rPr lang="en-US" smtClean="0"/>
-              <a:t>5/17/2015</a:t>
+              <a:t>5/19/2015</a:t>
             </a:fld>
             <a:endParaRPr lang="en-US"/>
           </a:p>
@@ -2141,7 +2140,7 @@
           <a:p>
             <a:fld id="{349BF3EA-1A78-4F07-BDC0-C8A1BD461199}" type="datetimeFigureOut">
               <a:rPr lang="en-US" smtClean="0"/>
-              <a:t>5/17/2015</a:t>
+              <a:t>5/19/2015</a:t>
             </a:fld>
             <a:endParaRPr lang="en-US"/>
           </a:p>
@@ -2472,7 +2471,7 @@
           <a:p>
             <a:fld id="{349BF3EA-1A78-4F07-BDC0-C8A1BD461199}" type="datetimeFigureOut">
               <a:rPr lang="en-US" smtClean="0"/>
-              <a:t>5/17/2015</a:t>
+              <a:t>5/19/2015</a:t>
             </a:fld>
             <a:endParaRPr lang="en-US"/>
           </a:p>
@@ -2727,7 +2726,7 @@
           <a:p>
             <a:fld id="{349BF3EA-1A78-4F07-BDC0-C8A1BD461199}" type="datetimeFigureOut">
               <a:rPr lang="en-US" smtClean="0"/>
-              <a:t>5/17/2015</a:t>
+              <a:t>5/19/2015</a:t>
             </a:fld>
             <a:endParaRPr lang="en-US"/>
           </a:p>
@@ -2834,7 +2833,7 @@
           <a:p>
             <a:fld id="{349BF3EA-1A78-4F07-BDC0-C8A1BD461199}" type="datetimeFigureOut">
               <a:rPr lang="en-US" smtClean="0"/>
-              <a:t>5/17/2015</a:t>
+              <a:t>5/19/2015</a:t>
             </a:fld>
             <a:endParaRPr lang="en-US"/>
           </a:p>
@@ -3133,7 +3132,7 @@
           <a:p>
             <a:fld id="{349BF3EA-1A78-4F07-BDC0-C8A1BD461199}" type="datetimeFigureOut">
               <a:rPr lang="en-US" smtClean="0"/>
-              <a:t>5/17/2015</a:t>
+              <a:t>5/19/2015</a:t>
             </a:fld>
             <a:endParaRPr lang="en-US"/>
           </a:p>
@@ -3421,7 +3420,7 @@
           <a:p>
             <a:fld id="{349BF3EA-1A78-4F07-BDC0-C8A1BD461199}" type="datetimeFigureOut">
               <a:rPr lang="en-US" smtClean="0"/>
-              <a:t>5/17/2015</a:t>
+              <a:t>5/19/2015</a:t>
             </a:fld>
             <a:endParaRPr lang="en-US"/>
           </a:p>
@@ -3551,7 +3550,7 @@
             <a:fld id="{349BF3EA-1A78-4F07-BDC0-C8A1BD461199}" type="datetimeFigureOut">
               <a:rPr lang="en-US" smtClean="0"/>
               <a:pPr/>
-              <a:t>5/17/2015</a:t>
+              <a:t>5/19/2015</a:t>
             </a:fld>
             <a:endParaRPr lang="en-US"/>
           </a:p>
@@ -4298,7 +4297,7 @@
           <a:p>
             <a:r>
               <a:rPr lang="en-US" smtClean="0"/>
-              <a:t>Key Spending Areas</a:t>
+              <a:t>Revenue and Profit</a:t>
             </a:r>
             <a:endParaRPr lang="en-US" dirty="0"/>
           </a:p>
@@ -4321,31 +4320,31 @@
           <a:p>
             <a:r>
               <a:rPr lang="en-US" smtClean="0"/>
-              <a:t>R&amp;D</a:t>
-            </a:r>
-          </a:p>
-          <a:p>
-            <a:r>
-              <a:rPr lang="en-US" smtClean="0"/>
-              <a:t>Sales and marketing.</a:t>
-            </a:r>
-          </a:p>
-          <a:p>
-            <a:r>
-              <a:rPr lang="en-US" smtClean="0"/>
-              <a:t>General and administration.</a:t>
-            </a:r>
-          </a:p>
-          <a:p>
-            <a:r>
-              <a:rPr lang="en-US" smtClean="0"/>
-              <a:t>Areas of improvement.</a:t>
-            </a:r>
-          </a:p>
-          <a:p>
-            <a:r>
-              <a:rPr lang="en-US" smtClean="0"/>
-              <a:t>Areas needing attention/caution.</a:t>
+              <a:t>Forecast vs. actual</a:t>
+            </a:r>
+          </a:p>
+          <a:p>
+            <a:r>
+              <a:rPr lang="en-US" smtClean="0"/>
+              <a:t>Gross margin</a:t>
+            </a:r>
+          </a:p>
+          <a:p>
+            <a:r>
+              <a:rPr lang="en-US" smtClean="0"/>
+              <a:t>Important trends</a:t>
+            </a:r>
+          </a:p>
+          <a:p>
+            <a:r>
+              <a:rPr lang="en-US" smtClean="0"/>
+              <a:t>Compare company to rest of market.</a:t>
+            </a:r>
+          </a:p>
+          <a:p>
+            <a:r>
+              <a:rPr lang="en-US" smtClean="0"/>
+              <a:t>Use multiple slides to break out meaningful detail.</a:t>
             </a:r>
             <a:endParaRPr lang="en-US" dirty="0"/>
           </a:p>
@@ -4354,7 +4353,7 @@
     </p:spTree>
     <p:extLst>
       <p:ext uri="{BB962C8B-B14F-4D97-AF65-F5344CB8AC3E}">
-        <p14:creationId xmlns:p14="http://schemas.microsoft.com/office/powerpoint/2010/main" val="1216751560"/>
+        <p14:creationId xmlns:p14="http://schemas.microsoft.com/office/powerpoint/2010/main" val="2519909124"/>
       </p:ext>
     </p:extLst>
   </p:cSld>
@@ -4618,113 +4617,6 @@
             <p:ph type="title"/>
           </p:nvPr>
         </p:nvSpPr>
-        <p:spPr/>
-        <p:txBody>
-          <a:bodyPr/>
-          <a:lstStyle/>
-          <a:p>
-            <a:r>
-              <a:rPr lang="en-US" smtClean="0"/>
-              <a:t>Summary</a:t>
-            </a:r>
-            <a:endParaRPr lang="en-US" dirty="0"/>
-          </a:p>
-        </p:txBody>
-      </p:sp>
-      <p:sp>
-        <p:nvSpPr>
-          <p:cNvPr id="3" name="Content Placeholder 2"/>
-          <p:cNvSpPr>
-            <a:spLocks noGrp="1"/>
-          </p:cNvSpPr>
-          <p:nvPr>
-            <p:ph idx="1"/>
-          </p:nvPr>
-        </p:nvSpPr>
-        <p:spPr/>
-        <p:txBody>
-          <a:bodyPr/>
-          <a:lstStyle/>
-          <a:p>
-            <a:r>
-              <a:rPr lang="en-US" smtClean="0"/>
-              <a:t>Summarize key successes/challenges.</a:t>
-            </a:r>
-          </a:p>
-          <a:p>
-            <a:r>
-              <a:rPr lang="en-US" smtClean="0"/>
-              <a:t>Reiterate key goals.</a:t>
-            </a:r>
-          </a:p>
-          <a:p>
-            <a:r>
-              <a:rPr lang="en-US" smtClean="0"/>
-              <a:t>Thanks</a:t>
-            </a:r>
-            <a:endParaRPr lang="en-US" dirty="0"/>
-          </a:p>
-        </p:txBody>
-      </p:sp>
-    </p:spTree>
-    <p:extLst>
-      <p:ext uri="{BB962C8B-B14F-4D97-AF65-F5344CB8AC3E}">
-        <p14:creationId xmlns:p14="http://schemas.microsoft.com/office/powerpoint/2010/main" val="2876187254"/>
-      </p:ext>
-    </p:extLst>
-  </p:cSld>
-  <p:clrMapOvr>
-    <a:masterClrMapping/>
-  </p:clrMapOvr>
-  <mc:AlternateContent xmlns:mc="http://schemas.openxmlformats.org/markup-compatibility/2006" xmlns:p14="http://schemas.microsoft.com/office/powerpoint/2010/main">
-    <mc:Choice Requires="p14">
-      <p:transition spd="med" p14:dur="700">
-        <p:fade/>
-      </p:transition>
-    </mc:Choice>
-    <mc:Fallback xmlns="">
-      <p:transition spd="med">
-        <p:fade/>
-      </p:transition>
-    </mc:Fallback>
-  </mc:AlternateContent>
-  <p:timing>
-    <p:tnLst>
-      <p:par>
-        <p:cTn id="1" dur="indefinite" restart="never" nodeType="tmRoot"/>
-      </p:par>
-    </p:tnLst>
-  </p:timing>
-</p:sld>
-</file>
-
-<file path=ppt/slides/slide14.xml><?xml version="1.0" encoding="utf-8"?>
-<p:sld xmlns:a="http://schemas.openxmlformats.org/drawingml/2006/main" xmlns:r="http://schemas.openxmlformats.org/officeDocument/2006/relationships" xmlns:p="http://schemas.openxmlformats.org/presentationml/2006/main">
-  <p:cSld>
-    <p:spTree>
-      <p:nvGrpSpPr>
-        <p:cNvPr id="1" name=""/>
-        <p:cNvGrpSpPr/>
-        <p:nvPr/>
-      </p:nvGrpSpPr>
-      <p:grpSpPr>
-        <a:xfrm>
-          <a:off x="0" y="0"/>
-          <a:ext cx="0" cy="0"/>
-          <a:chOff x="0" y="0"/>
-          <a:chExt cx="0" cy="0"/>
-        </a:xfrm>
-      </p:grpSpPr>
-      <p:sp>
-        <p:nvSpPr>
-          <p:cNvPr id="2" name="Title 1"/>
-          <p:cNvSpPr>
-            <a:spLocks noGrp="1"/>
-          </p:cNvSpPr>
-          <p:nvPr>
-            <p:ph type="title"/>
-          </p:nvPr>
-        </p:nvSpPr>
         <p:spPr>
           <a:xfrm>
             <a:off x="609600" y="-1"/>
@@ -4879,35 +4771,30 @@
               <a:rPr lang="en-US" dirty="0" smtClean="0"/>
               <a:t>RAID</a:t>
             </a:r>
-            <a:endParaRPr lang="en-US" dirty="0" smtClean="0"/>
           </a:p>
           <a:p>
             <a:r>
               <a:rPr lang="en-US" dirty="0" smtClean="0"/>
               <a:t>JBOD</a:t>
             </a:r>
-            <a:endParaRPr lang="en-US" dirty="0" smtClean="0"/>
           </a:p>
           <a:p>
             <a:r>
               <a:rPr lang="en-US" dirty="0" smtClean="0"/>
               <a:t>DAS</a:t>
             </a:r>
-            <a:endParaRPr lang="en-US" dirty="0" smtClean="0"/>
           </a:p>
           <a:p>
             <a:r>
               <a:rPr lang="en-US" dirty="0" smtClean="0"/>
               <a:t>SAN</a:t>
             </a:r>
-            <a:endParaRPr lang="en-US" dirty="0" smtClean="0"/>
           </a:p>
           <a:p>
             <a:r>
               <a:rPr lang="en-US" dirty="0" smtClean="0"/>
               <a:t>NAS</a:t>
             </a:r>
-            <a:endParaRPr lang="en-US" dirty="0" smtClean="0"/>
           </a:p>
           <a:p>
             <a:r>
@@ -4926,14 +4813,12 @@
               <a:rPr lang="en-US" dirty="0" smtClean="0"/>
               <a:t> Banco da Dados</a:t>
             </a:r>
-            <a:endParaRPr lang="en-US" dirty="0" smtClean="0"/>
           </a:p>
           <a:p>
             <a:r>
               <a:rPr lang="en-US" dirty="0" smtClean="0"/>
               <a:t>Cloud Computing</a:t>
             </a:r>
-            <a:endParaRPr lang="en-US" dirty="0" smtClean="0"/>
           </a:p>
           <a:p>
             <a:endParaRPr lang="en-US" dirty="0"/>
@@ -5005,15 +4890,16 @@
           <a:lstStyle/>
           <a:p>
             <a:r>
-              <a:rPr lang="en-US" smtClean="0"/>
-              <a:t>Review of Key Objectives</a:t>
-            </a:r>
-            <a:br>
-              <a:rPr lang="en-US" smtClean="0"/>
-            </a:br>
-            <a:r>
-              <a:rPr lang="en-US" smtClean="0"/>
-              <a:t>&amp; Critical Success Factors</a:t>
+              <a:rPr lang="en-US" dirty="0" err="1" smtClean="0"/>
+              <a:t>Dispositivos</a:t>
+            </a:r>
+            <a:r>
+              <a:rPr lang="en-US" dirty="0" smtClean="0"/>
+              <a:t> de </a:t>
+            </a:r>
+            <a:r>
+              <a:rPr lang="en-US" dirty="0" err="1" smtClean="0"/>
+              <a:t>Armazenamento</a:t>
             </a:r>
             <a:endParaRPr lang="en-US" dirty="0"/>
           </a:p>
@@ -5034,32 +4920,159 @@
           <a:bodyPr/>
           <a:lstStyle/>
           <a:p>
-            <a:r>
-              <a:rPr lang="en-US" smtClean="0"/>
-              <a:t>What makes company unique.</a:t>
-            </a:r>
-          </a:p>
-          <a:p>
-            <a:r>
-              <a:rPr lang="en-US" smtClean="0"/>
-              <a:t>What makes company successful.</a:t>
-            </a:r>
-          </a:p>
-          <a:p>
-            <a:r>
-              <a:rPr lang="en-US" smtClean="0"/>
-              <a:t>Shared vision.</a:t>
-            </a:r>
-          </a:p>
-          <a:p>
-            <a:r>
-              <a:rPr lang="en-US" smtClean="0"/>
-              <a:t>Review key undertakings of past year.</a:t>
-            </a:r>
             <a:endParaRPr lang="en-US" dirty="0" smtClean="0"/>
           </a:p>
-        </p:txBody>
-      </p:sp>
+          <a:p>
+            <a:r>
+              <a:rPr lang="en-US" dirty="0" err="1" smtClean="0"/>
+              <a:t>Dispositivos</a:t>
+            </a:r>
+            <a:r>
+              <a:rPr lang="en-US" dirty="0" smtClean="0"/>
+              <a:t> de </a:t>
+            </a:r>
+            <a:r>
+              <a:rPr lang="en-US" dirty="0" err="1" smtClean="0"/>
+              <a:t>Armazenamento</a:t>
+            </a:r>
+            <a:r>
+              <a:rPr lang="en-US" dirty="0" smtClean="0"/>
+              <a:t> </a:t>
+            </a:r>
+            <a:r>
+              <a:rPr lang="en-US" dirty="0" err="1" smtClean="0"/>
+              <a:t>podem</a:t>
+            </a:r>
+            <a:r>
+              <a:rPr lang="en-US" dirty="0" smtClean="0"/>
+              <a:t> </a:t>
+            </a:r>
+            <a:r>
+              <a:rPr lang="en-US" dirty="0" err="1" smtClean="0"/>
+              <a:t>ser</a:t>
+            </a:r>
+            <a:r>
+              <a:rPr lang="en-US" dirty="0" smtClean="0"/>
+              <a:t> </a:t>
+            </a:r>
+            <a:r>
+              <a:rPr lang="pt-BR" dirty="0"/>
+              <a:t>permanentes ou semipermanentes</a:t>
+            </a:r>
+            <a:r>
+              <a:rPr lang="pt-BR" dirty="0" smtClean="0"/>
+              <a:t>.</a:t>
+            </a:r>
+            <a:endParaRPr lang="en-US" dirty="0" smtClean="0"/>
+          </a:p>
+          <a:p>
+            <a:r>
+              <a:rPr lang="pt-BR" dirty="0"/>
+              <a:t>M</a:t>
+            </a:r>
+            <a:r>
+              <a:rPr lang="pt-BR" dirty="0" smtClean="0"/>
+              <a:t>ídia </a:t>
+            </a:r>
+            <a:r>
+              <a:rPr lang="pt-BR" dirty="0"/>
+              <a:t>de armazenamento </a:t>
+            </a:r>
+            <a:endParaRPr lang="pt-BR" dirty="0" smtClean="0"/>
+          </a:p>
+          <a:p>
+            <a:r>
+              <a:rPr lang="pt-BR" dirty="0" smtClean="0"/>
+              <a:t>Equipamento </a:t>
+            </a:r>
+            <a:r>
+              <a:rPr lang="pt-BR" dirty="0"/>
+              <a:t>de armazenamento de dados </a:t>
+            </a:r>
+            <a:endParaRPr lang="pt-BR" dirty="0" smtClean="0"/>
+          </a:p>
+          <a:p>
+            <a:r>
+              <a:rPr lang="pt-BR" dirty="0"/>
+              <a:t>Memória RAM não é um dispositivo de </a:t>
+            </a:r>
+            <a:r>
+              <a:rPr lang="pt-BR" dirty="0" smtClean="0"/>
+              <a:t>armazenamento</a:t>
+            </a:r>
+          </a:p>
+          <a:p>
+            <a:r>
+              <a:rPr lang="pt-BR" dirty="0" smtClean="0"/>
+              <a:t>3 tipos :</a:t>
+            </a:r>
+          </a:p>
+          <a:p>
+            <a:pPr lvl="1"/>
+            <a:r>
+              <a:rPr lang="pt-BR" dirty="0"/>
+              <a:t>meios </a:t>
+            </a:r>
+            <a:r>
+              <a:rPr lang="pt-BR" dirty="0" smtClean="0"/>
+              <a:t>ópticos</a:t>
+            </a:r>
+          </a:p>
+          <a:p>
+            <a:pPr lvl="1"/>
+            <a:r>
+              <a:rPr lang="pt-BR" dirty="0"/>
+              <a:t>meios </a:t>
+            </a:r>
+            <a:r>
+              <a:rPr lang="pt-BR" dirty="0" smtClean="0"/>
+              <a:t>magnéticos</a:t>
+            </a:r>
+          </a:p>
+          <a:p>
+            <a:pPr lvl="1"/>
+            <a:r>
+              <a:rPr lang="pt-BR" dirty="0" smtClean="0"/>
+              <a:t>meios </a:t>
+            </a:r>
+            <a:r>
+              <a:rPr lang="pt-BR" dirty="0"/>
+              <a:t>eletrônicos</a:t>
+            </a:r>
+            <a:endParaRPr lang="en-US" dirty="0" smtClean="0"/>
+          </a:p>
+        </p:txBody>
+      </p:sp>
+      <p:pic>
+        <p:nvPicPr>
+          <p:cNvPr id="4" name="Picture 3"/>
+          <p:cNvPicPr>
+            <a:picLocks noChangeAspect="1"/>
+          </p:cNvPicPr>
+          <p:nvPr/>
+        </p:nvPicPr>
+        <p:blipFill>
+          <a:blip r:embed="rId2">
+            <a:extLst>
+              <a:ext uri="{28A0092B-C50C-407E-A947-70E740481C1C}">
+                <a14:useLocalDpi xmlns:a14="http://schemas.microsoft.com/office/drawing/2010/main" val="0"/>
+              </a:ext>
+            </a:extLst>
+          </a:blip>
+          <a:stretch>
+            <a:fillRect/>
+          </a:stretch>
+        </p:blipFill>
+        <p:spPr>
+          <a:xfrm>
+            <a:off x="8783391" y="3960668"/>
+            <a:ext cx="3113333" cy="2165496"/>
+          </a:xfrm>
+          <a:prstGeom prst="rect">
+            <a:avLst/>
+          </a:prstGeom>
+        </p:spPr>
+      </p:pic>
     </p:spTree>
     <p:extLst>
       <p:ext uri="{BB962C8B-B14F-4D97-AF65-F5344CB8AC3E}">
@@ -5125,10 +5138,10 @@
           <a:lstStyle/>
           <a:p>
             <a:r>
-              <a:rPr lang="en-US" smtClean="0"/>
-              <a:t>How Did We Do?</a:t>
-            </a:r>
-            <a:endParaRPr lang="en-US" dirty="0"/>
+              <a:rPr lang="pt-BR" b="1" i="1" dirty="0"/>
+              <a:t>A evolução dos dispositivos de armazenamento</a:t>
+            </a:r>
+            <a:endParaRPr lang="pt-BR" dirty="0"/>
           </a:p>
         </p:txBody>
       </p:sp>
@@ -5147,18 +5160,68 @@
           <a:bodyPr/>
           <a:lstStyle/>
           <a:p>
-            <a:r>
-              <a:rPr lang="en-US" smtClean="0"/>
-              <a:t>Brief overview of performance against each objective.</a:t>
-            </a:r>
-            <a:endParaRPr lang="en-US" dirty="0" smtClean="0"/>
-          </a:p>
-        </p:txBody>
-      </p:sp>
+            <a:endParaRPr lang="pt-BR" dirty="0" smtClean="0"/>
+          </a:p>
+          <a:p>
+            <a:r>
+              <a:rPr lang="pt-BR" dirty="0" smtClean="0"/>
+              <a:t>“Menos é mais“ – equipamentos de pequeno tamanho e grande volume de armazenamento de dados</a:t>
+            </a:r>
+          </a:p>
+          <a:p>
+            <a:r>
+              <a:rPr lang="pt-BR" dirty="0" smtClean="0"/>
+              <a:t>Do disquete até os cartões de memória</a:t>
+            </a:r>
+          </a:p>
+          <a:p>
+            <a:pPr marL="0" indent="0">
+              <a:buNone/>
+            </a:pPr>
+            <a:endParaRPr lang="pt-BR" dirty="0" smtClean="0"/>
+          </a:p>
+          <a:p>
+            <a:endParaRPr lang="pt-BR" dirty="0" smtClean="0"/>
+          </a:p>
+          <a:p>
+            <a:endParaRPr lang="pt-BR" dirty="0"/>
+          </a:p>
+        </p:txBody>
+      </p:sp>
+      <p:pic>
+        <p:nvPicPr>
+          <p:cNvPr id="4" name="Picture 3"/>
+          <p:cNvPicPr>
+            <a:picLocks noChangeAspect="1"/>
+          </p:cNvPicPr>
+          <p:nvPr/>
+        </p:nvPicPr>
+        <p:blipFill>
+          <a:blip r:embed="rId2">
+            <a:extLst>
+              <a:ext uri="{28A0092B-C50C-407E-A947-70E740481C1C}">
+                <a14:useLocalDpi xmlns:a14="http://schemas.microsoft.com/office/drawing/2010/main" val="0"/>
+              </a:ext>
+            </a:extLst>
+          </a:blip>
+          <a:stretch>
+            <a:fillRect/>
+          </a:stretch>
+        </p:blipFill>
+        <p:spPr>
+          <a:xfrm>
+            <a:off x="609600" y="3413505"/>
+            <a:ext cx="10972800" cy="2712659"/>
+          </a:xfrm>
+          <a:prstGeom prst="rect">
+            <a:avLst/>
+          </a:prstGeom>
+        </p:spPr>
+      </p:pic>
     </p:spTree>
     <p:extLst>
       <p:ext uri="{BB962C8B-B14F-4D97-AF65-F5344CB8AC3E}">
-        <p14:creationId xmlns:p14="http://schemas.microsoft.com/office/powerpoint/2010/main" val="1794587301"/>
+        <p14:creationId xmlns:p14="http://schemas.microsoft.com/office/powerpoint/2010/main" val="2386594634"/>
       </p:ext>
     </p:extLst>
   </p:cSld>
@@ -5220,10 +5283,9 @@
           <a:lstStyle/>
           <a:p>
             <a:r>
-              <a:rPr lang="en-US" smtClean="0"/>
-              <a:t>Organizational Overview</a:t>
-            </a:r>
-            <a:endParaRPr lang="en-US" dirty="0"/>
+              <a:rPr lang="en-US" dirty="0"/>
+              <a:t>Interfaces de Conexão</a:t>
+            </a:r>
           </a:p>
         </p:txBody>
       </p:sp>
@@ -5242,26 +5304,305 @@
           <a:bodyPr/>
           <a:lstStyle/>
           <a:p>
-            <a:r>
-              <a:rPr lang="en-US" smtClean="0"/>
-              <a:t>Introduction and broad goals of each organization.</a:t>
-            </a:r>
-          </a:p>
-          <a:p>
-            <a:r>
-              <a:rPr lang="en-US" smtClean="0"/>
-              <a:t>Any changes.</a:t>
-            </a:r>
-          </a:p>
-          <a:p>
-            <a:r>
-              <a:rPr lang="en-US" smtClean="0"/>
-              <a:t>Organization chart might be effective here.</a:t>
-            </a:r>
+            <a:endParaRPr lang="en-US" dirty="0" smtClean="0"/>
+          </a:p>
+          <a:p>
+            <a:r>
+              <a:rPr lang="en-US" dirty="0" smtClean="0"/>
+              <a:t>ATA - </a:t>
+            </a:r>
+            <a:r>
+              <a:rPr lang="pt-BR" b="1" dirty="0" err="1"/>
+              <a:t>Advanced</a:t>
+            </a:r>
+            <a:r>
+              <a:rPr lang="pt-BR" b="1" dirty="0"/>
+              <a:t> Technology </a:t>
+            </a:r>
+            <a:r>
+              <a:rPr lang="pt-BR" b="1" dirty="0" err="1" smtClean="0"/>
+              <a:t>Attachment</a:t>
+            </a:r>
+            <a:endParaRPr lang="pt-BR" b="1" dirty="0" smtClean="0"/>
+          </a:p>
+          <a:p>
+            <a:r>
+              <a:rPr lang="pt-BR" b="1" dirty="0" smtClean="0"/>
+              <a:t>SATA </a:t>
+            </a:r>
+            <a:r>
+              <a:rPr lang="pt-BR" b="1" dirty="0"/>
+              <a:t>- Serial </a:t>
+            </a:r>
+            <a:r>
+              <a:rPr lang="pt-BR" b="1" dirty="0" err="1"/>
+              <a:t>Advanced</a:t>
+            </a:r>
+            <a:r>
+              <a:rPr lang="pt-BR" b="1" dirty="0"/>
+              <a:t> Technology </a:t>
+            </a:r>
+            <a:r>
+              <a:rPr lang="pt-BR" b="1" dirty="0" err="1" smtClean="0"/>
+              <a:t>Attachment</a:t>
+            </a:r>
+            <a:endParaRPr lang="pt-BR" b="1" dirty="0" smtClean="0"/>
+          </a:p>
+          <a:p>
+            <a:r>
+              <a:rPr lang="pt-BR" b="1" dirty="0" smtClean="0"/>
+              <a:t>SCSI - </a:t>
+            </a:r>
+            <a:r>
+              <a:rPr lang="pt-BR" b="1" dirty="0" err="1" smtClean="0"/>
+              <a:t>Small</a:t>
+            </a:r>
+            <a:r>
+              <a:rPr lang="pt-BR" b="1" dirty="0" smtClean="0"/>
+              <a:t> </a:t>
+            </a:r>
+            <a:r>
+              <a:rPr lang="pt-BR" b="1" dirty="0"/>
+              <a:t>Computer Systems </a:t>
+            </a:r>
+            <a:r>
+              <a:rPr lang="pt-BR" b="1" dirty="0" smtClean="0"/>
+              <a:t>Interface</a:t>
+            </a:r>
+          </a:p>
+          <a:p>
+            <a:r>
+              <a:rPr lang="pt-BR" b="1" dirty="0" smtClean="0"/>
+              <a:t>FC - </a:t>
+            </a:r>
+            <a:r>
+              <a:rPr lang="pt-BR" b="1" dirty="0" err="1" smtClean="0"/>
+              <a:t>Fibre</a:t>
+            </a:r>
+            <a:r>
+              <a:rPr lang="pt-BR" b="1" dirty="0" smtClean="0"/>
+              <a:t> </a:t>
+            </a:r>
+            <a:r>
+              <a:rPr lang="pt-BR" b="1" dirty="0" err="1" smtClean="0"/>
+              <a:t>Channel</a:t>
+            </a:r>
+            <a:endParaRPr lang="pt-BR" dirty="0"/>
+          </a:p>
+        </p:txBody>
+      </p:sp>
+    </p:spTree>
+    <p:extLst>
+      <p:ext uri="{BB962C8B-B14F-4D97-AF65-F5344CB8AC3E}">
+        <p14:creationId xmlns:p14="http://schemas.microsoft.com/office/powerpoint/2010/main" val="1794587301"/>
+      </p:ext>
+    </p:extLst>
+  </p:cSld>
+  <p:clrMapOvr>
+    <a:masterClrMapping/>
+  </p:clrMapOvr>
+  <mc:AlternateContent xmlns:mc="http://schemas.openxmlformats.org/markup-compatibility/2006" xmlns:p14="http://schemas.microsoft.com/office/powerpoint/2010/main">
+    <mc:Choice Requires="p14">
+      <p:transition spd="med" p14:dur="700">
+        <p:fade/>
+      </p:transition>
+    </mc:Choice>
+    <mc:Fallback xmlns="">
+      <p:transition spd="med">
+        <p:fade/>
+      </p:transition>
+    </mc:Fallback>
+  </mc:AlternateContent>
+  <p:timing>
+    <p:tnLst>
+      <p:par>
+        <p:cTn id="1" dur="indefinite" restart="never" nodeType="tmRoot"/>
+      </p:par>
+    </p:tnLst>
+  </p:timing>
+</p:sld>
+</file>
+
+<file path=ppt/slides/slide6.xml><?xml version="1.0" encoding="utf-8"?>
+<p:sld xmlns:a="http://schemas.openxmlformats.org/drawingml/2006/main" xmlns:r="http://schemas.openxmlformats.org/officeDocument/2006/relationships" xmlns:p="http://schemas.openxmlformats.org/presentationml/2006/main">
+  <p:cSld>
+    <p:spTree>
+      <p:nvGrpSpPr>
+        <p:cNvPr id="1" name=""/>
+        <p:cNvGrpSpPr/>
+        <p:nvPr/>
+      </p:nvGrpSpPr>
+      <p:grpSpPr>
+        <a:xfrm>
+          <a:off x="0" y="0"/>
+          <a:ext cx="0" cy="0"/>
+          <a:chOff x="0" y="0"/>
+          <a:chExt cx="0" cy="0"/>
+        </a:xfrm>
+      </p:grpSpPr>
+      <p:sp>
+        <p:nvSpPr>
+          <p:cNvPr id="2" name="Title 1"/>
+          <p:cNvSpPr>
+            <a:spLocks noGrp="1"/>
+          </p:cNvSpPr>
+          <p:nvPr>
+            <p:ph type="title"/>
+          </p:nvPr>
+        </p:nvSpPr>
+        <p:spPr>
+          <a:xfrm>
+            <a:off x="0" y="-122831"/>
+            <a:ext cx="12192000" cy="1600202"/>
+          </a:xfrm>
+        </p:spPr>
+        <p:txBody>
+          <a:bodyPr/>
+          <a:lstStyle/>
+          <a:p>
+            <a:r>
+              <a:rPr lang="en-US" sz="4000" dirty="0" smtClean="0"/>
+              <a:t>RAID - </a:t>
+            </a:r>
+            <a:r>
+              <a:rPr lang="en-US" sz="4000" dirty="0"/>
+              <a:t>Redundant Array of Inexpensive </a:t>
+            </a:r>
+            <a:r>
+              <a:rPr lang="en-US" sz="4000" dirty="0" smtClean="0"/>
+              <a:t>Disks</a:t>
+            </a:r>
+            <a:endParaRPr lang="en-US" sz="4000" dirty="0"/>
+          </a:p>
+        </p:txBody>
+      </p:sp>
+      <p:sp>
+        <p:nvSpPr>
+          <p:cNvPr id="3" name="Content Placeholder 2"/>
+          <p:cNvSpPr>
+            <a:spLocks noGrp="1"/>
+          </p:cNvSpPr>
+          <p:nvPr>
+            <p:ph idx="1"/>
+          </p:nvPr>
+        </p:nvSpPr>
+        <p:spPr/>
+        <p:txBody>
+          <a:bodyPr/>
+          <a:lstStyle/>
+          <a:p>
+            <a:endParaRPr lang="en-US" dirty="0" smtClean="0"/>
+          </a:p>
+          <a:p>
+            <a:r>
+              <a:rPr lang="pt-BR" dirty="0"/>
+              <a:t>“</a:t>
+            </a:r>
+            <a:r>
+              <a:rPr lang="pt-BR" dirty="0" err="1"/>
+              <a:t>Redundant</a:t>
+            </a:r>
+            <a:r>
+              <a:rPr lang="pt-BR" dirty="0"/>
+              <a:t> </a:t>
+            </a:r>
+            <a:r>
+              <a:rPr lang="pt-BR" dirty="0" err="1"/>
+              <a:t>Array</a:t>
+            </a:r>
+            <a:r>
+              <a:rPr lang="pt-BR" dirty="0"/>
+              <a:t> </a:t>
+            </a:r>
+            <a:r>
+              <a:rPr lang="pt-BR" dirty="0" err="1"/>
+              <a:t>of</a:t>
+            </a:r>
+            <a:r>
+              <a:rPr lang="pt-BR" dirty="0"/>
+              <a:t> </a:t>
+            </a:r>
+            <a:r>
+              <a:rPr lang="pt-BR" dirty="0" err="1"/>
+              <a:t>Inexpensive</a:t>
+            </a:r>
+            <a:r>
+              <a:rPr lang="pt-BR" dirty="0"/>
+              <a:t> Disks” ou Matriz Redundante de Discos Baratos. </a:t>
+            </a:r>
+          </a:p>
+          <a:p>
+            <a:r>
+              <a:rPr lang="en-US" dirty="0" smtClean="0"/>
+              <a:t>RAID 0</a:t>
+            </a:r>
+            <a:endParaRPr lang="en-US" dirty="0" smtClean="0"/>
+          </a:p>
+          <a:p>
+            <a:r>
+              <a:rPr lang="en-US" dirty="0" smtClean="0"/>
+              <a:t>RAID 1</a:t>
+            </a:r>
+          </a:p>
+          <a:p>
+            <a:r>
+              <a:rPr lang="en-US" dirty="0" smtClean="0"/>
+              <a:t>RAID 0+1</a:t>
+            </a:r>
+          </a:p>
+          <a:p>
+            <a:r>
+              <a:rPr lang="en-US" dirty="0" smtClean="0"/>
+              <a:t>RAID 5</a:t>
+            </a:r>
+          </a:p>
+          <a:p>
+            <a:r>
+              <a:rPr lang="en-US" dirty="0" smtClean="0"/>
+              <a:t>RAID 6</a:t>
+            </a:r>
+          </a:p>
+          <a:p>
+            <a:r>
+              <a:rPr lang="en-US" dirty="0" smtClean="0"/>
+              <a:t>RAID 2,3,4</a:t>
+            </a:r>
+          </a:p>
+          <a:p>
             <a:endParaRPr lang="en-US" dirty="0"/>
           </a:p>
         </p:txBody>
       </p:sp>
+      <p:pic>
+        <p:nvPicPr>
+          <p:cNvPr id="4" name="Picture 3"/>
+          <p:cNvPicPr>
+            <a:picLocks noChangeAspect="1"/>
+          </p:cNvPicPr>
+          <p:nvPr/>
+        </p:nvPicPr>
+        <p:blipFill>
+          <a:blip r:embed="rId2">
+            <a:extLst>
+              <a:ext uri="{28A0092B-C50C-407E-A947-70E740481C1C}">
+                <a14:useLocalDpi xmlns:a14="http://schemas.microsoft.com/office/drawing/2010/main" val="0"/>
+              </a:ext>
+            </a:extLst>
+          </a:blip>
+          <a:stretch>
+            <a:fillRect/>
+          </a:stretch>
+        </p:blipFill>
+        <p:spPr>
+          <a:xfrm>
+            <a:off x="2934266" y="2665570"/>
+            <a:ext cx="8443415" cy="3446946"/>
+          </a:xfrm>
+          <a:prstGeom prst="rect">
+            <a:avLst/>
+          </a:prstGeom>
+        </p:spPr>
+      </p:pic>
     </p:spTree>
     <p:extLst>
       <p:ext uri="{BB962C8B-B14F-4D97-AF65-F5344CB8AC3E}">
@@ -5294,7 +5635,7 @@
 </p:sld>
 </file>
 
-<file path=ppt/slides/slide6.xml><?xml version="1.0" encoding="utf-8"?>
+<file path=ppt/slides/slide7.xml><?xml version="1.0" encoding="utf-8"?>
 <p:sld xmlns:a="http://schemas.openxmlformats.org/drawingml/2006/main" xmlns:r="http://schemas.openxmlformats.org/officeDocument/2006/relationships" xmlns:p="http://schemas.openxmlformats.org/presentationml/2006/main">
   <p:cSld>
     <p:spTree>
@@ -5532,7 +5873,7 @@
 </p:sld>
 </file>
 
-<file path=ppt/slides/slide7.xml><?xml version="1.0" encoding="utf-8"?>
+<file path=ppt/slides/slide8.xml><?xml version="1.0" encoding="utf-8"?>
 <p:sld xmlns:a="http://schemas.openxmlformats.org/drawingml/2006/main" xmlns:r="http://schemas.openxmlformats.org/officeDocument/2006/relationships" xmlns:p="http://schemas.openxmlformats.org/presentationml/2006/main">
   <p:cSld>
     <p:spTree>
@@ -5828,129 +6169,6 @@
 </p:sld>
 </file>
 
-<file path=ppt/slides/slide8.xml><?xml version="1.0" encoding="utf-8"?>
-<p:sld xmlns:a="http://schemas.openxmlformats.org/drawingml/2006/main" xmlns:r="http://schemas.openxmlformats.org/officeDocument/2006/relationships" xmlns:p="http://schemas.openxmlformats.org/presentationml/2006/main">
-  <p:cSld>
-    <p:spTree>
-      <p:nvGrpSpPr>
-        <p:cNvPr id="1" name=""/>
-        <p:cNvGrpSpPr/>
-        <p:nvPr/>
-      </p:nvGrpSpPr>
-      <p:grpSpPr>
-        <a:xfrm>
-          <a:off x="0" y="0"/>
-          <a:ext cx="0" cy="0"/>
-          <a:chOff x="0" y="0"/>
-          <a:chExt cx="0" cy="0"/>
-        </a:xfrm>
-      </p:grpSpPr>
-      <p:sp>
-        <p:nvSpPr>
-          <p:cNvPr id="2" name="Title 1"/>
-          <p:cNvSpPr>
-            <a:spLocks noGrp="1"/>
-          </p:cNvSpPr>
-          <p:nvPr>
-            <p:ph type="title"/>
-          </p:nvPr>
-        </p:nvSpPr>
-        <p:spPr/>
-        <p:txBody>
-          <a:bodyPr/>
-          <a:lstStyle/>
-          <a:p>
-            <a:r>
-              <a:rPr lang="en-US" smtClean="0"/>
-              <a:t>Progress Against Goals</a:t>
-            </a:r>
-            <a:endParaRPr lang="en-US" dirty="0"/>
-          </a:p>
-        </p:txBody>
-      </p:sp>
-      <p:sp>
-        <p:nvSpPr>
-          <p:cNvPr id="3" name="Content Placeholder 2"/>
-          <p:cNvSpPr>
-            <a:spLocks noGrp="1"/>
-          </p:cNvSpPr>
-          <p:nvPr>
-            <p:ph idx="1"/>
-          </p:nvPr>
-        </p:nvSpPr>
-        <p:spPr/>
-        <p:txBody>
-          <a:bodyPr/>
-          <a:lstStyle/>
-          <a:p>
-            <a:r>
-              <a:rPr lang="en-US" smtClean="0"/>
-              <a:t>Summary of key financial results.</a:t>
-            </a:r>
-          </a:p>
-          <a:p>
-            <a:pPr lvl="1"/>
-            <a:r>
-              <a:rPr lang="en-US" smtClean="0"/>
-              <a:t>Revenue</a:t>
-            </a:r>
-          </a:p>
-          <a:p>
-            <a:pPr lvl="1"/>
-            <a:r>
-              <a:rPr lang="en-US" smtClean="0"/>
-              <a:t>Profit</a:t>
-            </a:r>
-          </a:p>
-          <a:p>
-            <a:pPr lvl="1"/>
-            <a:r>
-              <a:rPr lang="en-US" smtClean="0"/>
-              <a:t>Key spending areas</a:t>
-            </a:r>
-          </a:p>
-          <a:p>
-            <a:pPr lvl="1"/>
-            <a:r>
-              <a:rPr lang="en-US" smtClean="0"/>
-              <a:t>Headcount</a:t>
-            </a:r>
-            <a:endParaRPr lang="en-US" dirty="0"/>
-          </a:p>
-        </p:txBody>
-      </p:sp>
-    </p:spTree>
-    <p:extLst>
-      <p:ext uri="{BB962C8B-B14F-4D97-AF65-F5344CB8AC3E}">
-        <p14:creationId xmlns:p14="http://schemas.microsoft.com/office/powerpoint/2010/main" val="3801660654"/>
-      </p:ext>
-    </p:extLst>
-  </p:cSld>
-  <p:clrMapOvr>
-    <a:masterClrMapping/>
-  </p:clrMapOvr>
-  <mc:AlternateContent xmlns:mc="http://schemas.openxmlformats.org/markup-compatibility/2006" xmlns:p14="http://schemas.microsoft.com/office/powerpoint/2010/main">
-    <mc:Choice Requires="p14">
-      <p:transition spd="med" p14:dur="700">
-        <p:fade/>
-      </p:transition>
-    </mc:Choice>
-    <mc:Fallback xmlns="">
-      <p:transition spd="med">
-        <p:fade/>
-      </p:transition>
-    </mc:Fallback>
-  </mc:AlternateContent>
-  <p:timing>
-    <p:tnLst>
-      <p:par>
-        <p:cTn id="1" dur="indefinite" restart="never" nodeType="tmRoot"/>
-      </p:par>
-    </p:tnLst>
-  </p:timing>
-</p:sld>
-</file>
-
 <file path=ppt/slides/slide9.xml><?xml version="1.0" encoding="utf-8"?>
 <p:sld xmlns:a="http://schemas.openxmlformats.org/drawingml/2006/main" xmlns:r="http://schemas.openxmlformats.org/officeDocument/2006/relationships" xmlns:p="http://schemas.openxmlformats.org/presentationml/2006/main">
   <p:cSld>
@@ -5984,8 +6202,8 @@
           <a:lstStyle/>
           <a:p>
             <a:r>
-              <a:rPr lang="en-US" smtClean="0"/>
-              <a:t>Revenue and Profit</a:t>
+              <a:rPr lang="en-US" dirty="0" smtClean="0"/>
+              <a:t>SAN – “Storage Area Network”</a:t>
             </a:r>
             <a:endParaRPr lang="en-US" dirty="0"/>
           </a:p>
@@ -6006,42 +6224,87 @@
           <a:bodyPr/>
           <a:lstStyle/>
           <a:p>
-            <a:r>
-              <a:rPr lang="en-US" smtClean="0"/>
-              <a:t>Forecast vs. actual</a:t>
-            </a:r>
-          </a:p>
-          <a:p>
-            <a:r>
-              <a:rPr lang="en-US" smtClean="0"/>
-              <a:t>Gross margin</a:t>
-            </a:r>
-          </a:p>
-          <a:p>
-            <a:r>
-              <a:rPr lang="en-US" smtClean="0"/>
-              <a:t>Important trends</a:t>
-            </a:r>
-          </a:p>
-          <a:p>
-            <a:r>
-              <a:rPr lang="en-US" smtClean="0"/>
-              <a:t>Compare company to rest of market.</a:t>
-            </a:r>
-          </a:p>
-          <a:p>
-            <a:r>
-              <a:rPr lang="en-US" smtClean="0"/>
-              <a:t>Use multiple slides to break out meaningful detail.</a:t>
-            </a:r>
-            <a:endParaRPr lang="en-US" dirty="0"/>
+            <a:endParaRPr lang="en-US" dirty="0" smtClean="0"/>
+          </a:p>
+          <a:p>
+            <a:r>
+              <a:rPr lang="en-US" dirty="0" err="1" smtClean="0"/>
+              <a:t>Conectar</a:t>
+            </a:r>
+            <a:r>
+              <a:rPr lang="en-US" dirty="0" smtClean="0"/>
+              <a:t> </a:t>
+            </a:r>
+            <a:r>
+              <a:rPr lang="en-US" dirty="0" err="1" smtClean="0"/>
+              <a:t>dispositivos</a:t>
+            </a:r>
+            <a:r>
+              <a:rPr lang="en-US" dirty="0" smtClean="0"/>
+              <a:t> </a:t>
+            </a:r>
+            <a:r>
+              <a:rPr lang="en-US" dirty="0" err="1" smtClean="0"/>
+              <a:t>na</a:t>
+            </a:r>
+            <a:r>
+              <a:rPr lang="en-US" dirty="0"/>
+              <a:t> </a:t>
+            </a:r>
+            <a:r>
+              <a:rPr lang="en-US" dirty="0" err="1" smtClean="0"/>
+              <a:t>rede</a:t>
+            </a:r>
+            <a:endParaRPr lang="en-US" dirty="0" smtClean="0"/>
+          </a:p>
+          <a:p>
+            <a:r>
+              <a:rPr lang="pt-BR" dirty="0" smtClean="0"/>
+              <a:t>Usa </a:t>
+            </a:r>
+            <a:r>
+              <a:rPr lang="pt-BR" dirty="0"/>
+              <a:t>preferencialmente a fibra </a:t>
+            </a:r>
+            <a:r>
+              <a:rPr lang="pt-BR" dirty="0" smtClean="0"/>
+              <a:t>ótica</a:t>
+            </a:r>
+            <a:endParaRPr lang="en-US" dirty="0" smtClean="0"/>
+          </a:p>
+          <a:p>
+            <a:pPr lvl="1"/>
+            <a:r>
+              <a:rPr lang="pt-BR" dirty="0" smtClean="0">
+                <a:solidFill>
+                  <a:srgbClr val="FF0000"/>
+                </a:solidFill>
+              </a:rPr>
+              <a:t>conectar </a:t>
+            </a:r>
+            <a:r>
+              <a:rPr lang="pt-BR" dirty="0">
+                <a:solidFill>
+                  <a:srgbClr val="FF0000"/>
+                </a:solidFill>
+              </a:rPr>
+              <a:t>dispositivos de armazenamento de dados remotos a servidores, de maneira que aparentam que os dispositivos estão ligados fisicamente ao </a:t>
+            </a:r>
+            <a:r>
+              <a:rPr lang="pt-BR" dirty="0" smtClean="0">
+                <a:solidFill>
+                  <a:srgbClr val="FF0000"/>
+                </a:solidFill>
+              </a:rPr>
+              <a:t>servidor</a:t>
+            </a:r>
           </a:p>
         </p:txBody>
       </p:sp>
     </p:spTree>
     <p:extLst>
       <p:ext uri="{BB962C8B-B14F-4D97-AF65-F5344CB8AC3E}">
-        <p14:creationId xmlns:p14="http://schemas.microsoft.com/office/powerpoint/2010/main" val="2519909124"/>
+        <p14:creationId xmlns:p14="http://schemas.microsoft.com/office/powerpoint/2010/main" val="3801660654"/>
       </p:ext>
     </p:extLst>
   </p:cSld>

</xml_diff>

<commit_message>
Versão Final do Trabalho
Versão Final do Trabalho, porém somente com minha parte da apresentação
</commit_message>
<xml_diff>
--- a/ApresentacaoArmazenamento.pptx
+++ b/ApresentacaoArmazenamento.pptx
@@ -5,25 +5,24 @@
     <p:sldMasterId id="2147483672" r:id="rId2"/>
   </p:sldMasterIdLst>
   <p:notesMasterIdLst>
-    <p:notesMasterId r:id="rId16"/>
+    <p:notesMasterId r:id="rId15"/>
   </p:notesMasterIdLst>
   <p:handoutMasterIdLst>
-    <p:handoutMasterId r:id="rId17"/>
+    <p:handoutMasterId r:id="rId16"/>
   </p:handoutMasterIdLst>
   <p:sldIdLst>
     <p:sldId id="270" r:id="rId3"/>
     <p:sldId id="271" r:id="rId4"/>
     <p:sldId id="272" r:id="rId5"/>
     <p:sldId id="284" r:id="rId6"/>
-    <p:sldId id="273" r:id="rId7"/>
-    <p:sldId id="274" r:id="rId8"/>
-    <p:sldId id="275" r:id="rId9"/>
-    <p:sldId id="276" r:id="rId10"/>
-    <p:sldId id="277" r:id="rId11"/>
-    <p:sldId id="278" r:id="rId12"/>
-    <p:sldId id="280" r:id="rId13"/>
-    <p:sldId id="281" r:id="rId14"/>
-    <p:sldId id="283" r:id="rId15"/>
+    <p:sldId id="274" r:id="rId7"/>
+    <p:sldId id="275" r:id="rId8"/>
+    <p:sldId id="276" r:id="rId9"/>
+    <p:sldId id="277" r:id="rId10"/>
+    <p:sldId id="278" r:id="rId11"/>
+    <p:sldId id="280" r:id="rId12"/>
+    <p:sldId id="285" r:id="rId13"/>
+    <p:sldId id="283" r:id="rId14"/>
   </p:sldIdLst>
   <p:sldSz cx="12192000" cy="6858000"/>
   <p:notesSz cx="6858000" cy="9144000"/>
@@ -215,7 +214,7 @@
           <a:p>
             <a:fld id="{65700FC0-9E7A-4C53-8A3B-3C3C9A736C42}" type="datetimeFigureOut">
               <a:rPr lang="en-US" smtClean="0"/>
-              <a:t>5/19/2015</a:t>
+              <a:t>5/26/2015</a:t>
             </a:fld>
             <a:endParaRPr lang="en-US"/>
           </a:p>
@@ -380,7 +379,7 @@
           <a:p>
             <a:fld id="{8AF122B6-E47E-4A80-A9F3-23FD10D674FE}" type="datetimeFigureOut">
               <a:rPr lang="en-US" smtClean="0"/>
-              <a:t>5/19/2015</a:t>
+              <a:t>5/26/2015</a:t>
             </a:fld>
             <a:endParaRPr lang="en-US"/>
           </a:p>
@@ -691,7 +690,7 @@
             <a:fld id="{349BF3EA-1A78-4F07-BDC0-C8A1BD461199}" type="datetimeFigureOut">
               <a:rPr lang="en-US" smtClean="0"/>
               <a:pPr/>
-              <a:t>5/19/2015</a:t>
+              <a:t>5/26/2015</a:t>
             </a:fld>
             <a:endParaRPr lang="en-US"/>
           </a:p>
@@ -1052,7 +1051,7 @@
           <a:p>
             <a:fld id="{349BF3EA-1A78-4F07-BDC0-C8A1BD461199}" type="datetimeFigureOut">
               <a:rPr lang="en-US" smtClean="0"/>
-              <a:t>5/19/2015</a:t>
+              <a:t>5/26/2015</a:t>
             </a:fld>
             <a:endParaRPr lang="en-US"/>
           </a:p>
@@ -1250,7 +1249,7 @@
           <a:p>
             <a:fld id="{349BF3EA-1A78-4F07-BDC0-C8A1BD461199}" type="datetimeFigureOut">
               <a:rPr lang="en-US" smtClean="0"/>
-              <a:t>5/19/2015</a:t>
+              <a:t>5/26/2015</a:t>
             </a:fld>
             <a:endParaRPr lang="en-US"/>
           </a:p>
@@ -1498,7 +1497,7 @@
           <a:p>
             <a:fld id="{349BF3EA-1A78-4F07-BDC0-C8A1BD461199}" type="datetimeFigureOut">
               <a:rPr lang="en-US" smtClean="0"/>
-              <a:t>5/19/2015</a:t>
+              <a:t>5/26/2015</a:t>
             </a:fld>
             <a:endParaRPr lang="en-US"/>
           </a:p>
@@ -1769,7 +1768,7 @@
           <a:p>
             <a:fld id="{349BF3EA-1A78-4F07-BDC0-C8A1BD461199}" type="datetimeFigureOut">
               <a:rPr lang="en-US" smtClean="0"/>
-              <a:t>5/19/2015</a:t>
+              <a:t>5/26/2015</a:t>
             </a:fld>
             <a:endParaRPr lang="en-US"/>
           </a:p>
@@ -2140,7 +2139,7 @@
           <a:p>
             <a:fld id="{349BF3EA-1A78-4F07-BDC0-C8A1BD461199}" type="datetimeFigureOut">
               <a:rPr lang="en-US" smtClean="0"/>
-              <a:t>5/19/2015</a:t>
+              <a:t>5/26/2015</a:t>
             </a:fld>
             <a:endParaRPr lang="en-US"/>
           </a:p>
@@ -2471,7 +2470,7 @@
           <a:p>
             <a:fld id="{349BF3EA-1A78-4F07-BDC0-C8A1BD461199}" type="datetimeFigureOut">
               <a:rPr lang="en-US" smtClean="0"/>
-              <a:t>5/19/2015</a:t>
+              <a:t>5/26/2015</a:t>
             </a:fld>
             <a:endParaRPr lang="en-US"/>
           </a:p>
@@ -2726,7 +2725,7 @@
           <a:p>
             <a:fld id="{349BF3EA-1A78-4F07-BDC0-C8A1BD461199}" type="datetimeFigureOut">
               <a:rPr lang="en-US" smtClean="0"/>
-              <a:t>5/19/2015</a:t>
+              <a:t>5/26/2015</a:t>
             </a:fld>
             <a:endParaRPr lang="en-US"/>
           </a:p>
@@ -2833,7 +2832,7 @@
           <a:p>
             <a:fld id="{349BF3EA-1A78-4F07-BDC0-C8A1BD461199}" type="datetimeFigureOut">
               <a:rPr lang="en-US" smtClean="0"/>
-              <a:t>5/19/2015</a:t>
+              <a:t>5/26/2015</a:t>
             </a:fld>
             <a:endParaRPr lang="en-US"/>
           </a:p>
@@ -3132,7 +3131,7 @@
           <a:p>
             <a:fld id="{349BF3EA-1A78-4F07-BDC0-C8A1BD461199}" type="datetimeFigureOut">
               <a:rPr lang="en-US" smtClean="0"/>
-              <a:t>5/19/2015</a:t>
+              <a:t>5/26/2015</a:t>
             </a:fld>
             <a:endParaRPr lang="en-US"/>
           </a:p>
@@ -3420,7 +3419,7 @@
           <a:p>
             <a:fld id="{349BF3EA-1A78-4F07-BDC0-C8A1BD461199}" type="datetimeFigureOut">
               <a:rPr lang="en-US" smtClean="0"/>
-              <a:t>5/19/2015</a:t>
+              <a:t>5/26/2015</a:t>
             </a:fld>
             <a:endParaRPr lang="en-US"/>
           </a:p>
@@ -3550,7 +3549,7 @@
             <a:fld id="{349BF3EA-1A78-4F07-BDC0-C8A1BD461199}" type="datetimeFigureOut">
               <a:rPr lang="en-US" smtClean="0"/>
               <a:pPr/>
-              <a:t>5/19/2015</a:t>
+              <a:t>5/26/2015</a:t>
             </a:fld>
             <a:endParaRPr lang="en-US"/>
           </a:p>
@@ -4296,10 +4295,22 @@
           <a:lstStyle/>
           <a:p>
             <a:r>
-              <a:rPr lang="en-US" smtClean="0"/>
-              <a:t>Revenue and Profit</a:t>
-            </a:r>
-            <a:endParaRPr lang="en-US" dirty="0"/>
+              <a:rPr lang="en-US" sz="4550" dirty="0" err="1" smtClean="0"/>
+              <a:t>Armazenamento</a:t>
+            </a:r>
+            <a:r>
+              <a:rPr lang="en-US" sz="4550" dirty="0" smtClean="0"/>
+              <a:t> </a:t>
+            </a:r>
+            <a:r>
+              <a:rPr lang="en-US" sz="4550" dirty="0" err="1" smtClean="0"/>
+              <a:t>em</a:t>
+            </a:r>
+            <a:r>
+              <a:rPr lang="en-US" sz="4550" dirty="0" smtClean="0"/>
+              <a:t> Banco de Dados</a:t>
+            </a:r>
+            <a:endParaRPr lang="en-US" sz="4550" dirty="0"/>
           </a:p>
         </p:txBody>
       </p:sp>
@@ -4313,47 +4324,139 @@
             <p:ph idx="1"/>
           </p:nvPr>
         </p:nvSpPr>
-        <p:spPr/>
-        <p:txBody>
-          <a:bodyPr/>
+        <p:spPr>
+          <a:xfrm>
+            <a:off x="880056" y="1600200"/>
+            <a:ext cx="10972800" cy="4525963"/>
+          </a:xfrm>
+        </p:spPr>
+        <p:txBody>
+          <a:bodyPr numCol="1"/>
           <a:lstStyle/>
           <a:p>
-            <a:r>
-              <a:rPr lang="en-US" smtClean="0"/>
-              <a:t>Forecast vs. actual</a:t>
-            </a:r>
-          </a:p>
-          <a:p>
-            <a:r>
-              <a:rPr lang="en-US" smtClean="0"/>
-              <a:t>Gross margin</a:t>
-            </a:r>
-          </a:p>
-          <a:p>
-            <a:r>
-              <a:rPr lang="en-US" smtClean="0"/>
-              <a:t>Important trends</a:t>
-            </a:r>
-          </a:p>
-          <a:p>
-            <a:r>
-              <a:rPr lang="en-US" smtClean="0"/>
-              <a:t>Compare company to rest of market.</a:t>
-            </a:r>
-          </a:p>
-          <a:p>
-            <a:r>
-              <a:rPr lang="en-US" smtClean="0"/>
-              <a:t>Use multiple slides to break out meaningful detail.</a:t>
-            </a:r>
-            <a:endParaRPr lang="en-US" dirty="0"/>
+            <a:pPr marL="0" indent="0">
+              <a:buNone/>
+            </a:pPr>
+            <a:endParaRPr lang="en-US" dirty="0" smtClean="0"/>
+          </a:p>
+          <a:p>
+            <a:pPr>
+              <a:lnSpc>
+                <a:spcPct val="150000"/>
+              </a:lnSpc>
+            </a:pPr>
+            <a:r>
+              <a:rPr lang="en-US" dirty="0" err="1" smtClean="0"/>
+              <a:t>Tipos</a:t>
+            </a:r>
+            <a:r>
+              <a:rPr lang="en-US" dirty="0" smtClean="0"/>
+              <a:t> de dados – “Datatypes</a:t>
+            </a:r>
+            <a:r>
+              <a:rPr lang="en-US" dirty="0" smtClean="0"/>
+              <a:t>”</a:t>
+            </a:r>
+            <a:endParaRPr lang="en-US" dirty="0" smtClean="0"/>
+          </a:p>
+          <a:p>
+            <a:pPr lvl="1">
+              <a:lnSpc>
+                <a:spcPct val="150000"/>
+              </a:lnSpc>
+            </a:pPr>
+            <a:r>
+              <a:rPr lang="en-US" sz="1800" dirty="0" smtClean="0"/>
+              <a:t>Dados </a:t>
+            </a:r>
+            <a:r>
+              <a:rPr lang="en-US" sz="1800" dirty="0" err="1" smtClean="0"/>
+              <a:t>númericos</a:t>
+            </a:r>
+            <a:r>
+              <a:rPr lang="en-US" sz="1800" dirty="0" smtClean="0"/>
+              <a:t> – INT, FLOAT, REAL, DECIMAL</a:t>
+            </a:r>
+          </a:p>
+          <a:p>
+            <a:pPr lvl="1">
+              <a:lnSpc>
+                <a:spcPct val="150000"/>
+              </a:lnSpc>
+            </a:pPr>
+            <a:r>
+              <a:rPr lang="en-US" sz="1800" dirty="0" smtClean="0"/>
+              <a:t>Dados </a:t>
+            </a:r>
+            <a:r>
+              <a:rPr lang="en-US" sz="1800" dirty="0" err="1" smtClean="0"/>
+              <a:t>monetários</a:t>
+            </a:r>
+            <a:r>
+              <a:rPr lang="en-US" sz="1800" dirty="0" smtClean="0"/>
+              <a:t> - MONEY</a:t>
+            </a:r>
+          </a:p>
+          <a:p>
+            <a:pPr lvl="1">
+              <a:lnSpc>
+                <a:spcPct val="150000"/>
+              </a:lnSpc>
+            </a:pPr>
+            <a:r>
+              <a:rPr lang="en-US" sz="1800" dirty="0" smtClean="0"/>
+              <a:t>Dados de </a:t>
+            </a:r>
+            <a:r>
+              <a:rPr lang="en-US" sz="1800" dirty="0" err="1" smtClean="0"/>
+              <a:t>texto</a:t>
+            </a:r>
+            <a:r>
+              <a:rPr lang="en-US" sz="1800" dirty="0" smtClean="0"/>
+              <a:t> – CHAR, VARCHAR, TEXT</a:t>
+            </a:r>
+            <a:endParaRPr lang="en-US" sz="1800" dirty="0"/>
+          </a:p>
+          <a:p>
+            <a:pPr lvl="1">
+              <a:lnSpc>
+                <a:spcPct val="150000"/>
+              </a:lnSpc>
+            </a:pPr>
+            <a:r>
+              <a:rPr lang="en-US" sz="1800" dirty="0" smtClean="0"/>
+              <a:t>Dados data e hora – DATETIME, DATE, TIME, TIMESTAMP</a:t>
+            </a:r>
+          </a:p>
+          <a:p>
+            <a:pPr lvl="1">
+              <a:lnSpc>
+                <a:spcPct val="150000"/>
+              </a:lnSpc>
+            </a:pPr>
+            <a:r>
+              <a:rPr lang="en-US" sz="1800" dirty="0" smtClean="0"/>
+              <a:t>Dados </a:t>
+            </a:r>
+            <a:r>
+              <a:rPr lang="en-US" sz="1800" dirty="0" err="1" smtClean="0"/>
+              <a:t>binários</a:t>
+            </a:r>
+            <a:r>
+              <a:rPr lang="en-US" sz="1800" dirty="0"/>
+              <a:t> </a:t>
+            </a:r>
+            <a:r>
+              <a:rPr lang="en-US" sz="1800" dirty="0" smtClean="0"/>
+              <a:t>– BIT, BINARY, VARBINARY</a:t>
+            </a:r>
           </a:p>
         </p:txBody>
       </p:sp>
     </p:spTree>
     <p:extLst>
       <p:ext uri="{BB962C8B-B14F-4D97-AF65-F5344CB8AC3E}">
-        <p14:creationId xmlns:p14="http://schemas.microsoft.com/office/powerpoint/2010/main" val="2519909124"/>
+        <p14:creationId xmlns:p14="http://schemas.microsoft.com/office/powerpoint/2010/main" val="2303474947"/>
       </p:ext>
     </p:extLst>
   </p:cSld>
@@ -4415,10 +4518,14 @@
           <a:lstStyle/>
           <a:p>
             <a:r>
-              <a:rPr lang="en-US" smtClean="0"/>
-              <a:t>Headcount</a:t>
-            </a:r>
-            <a:endParaRPr lang="en-US" dirty="0"/>
+              <a:rPr lang="pt-BR" dirty="0" smtClean="0"/>
+              <a:t>Clou </a:t>
+            </a:r>
+            <a:r>
+              <a:rPr lang="pt-BR" dirty="0" err="1" smtClean="0"/>
+              <a:t>Computing</a:t>
+            </a:r>
+            <a:endParaRPr lang="pt-BR" dirty="0"/>
           </a:p>
         </p:txBody>
       </p:sp>
@@ -4437,24 +4544,14 @@
           <a:bodyPr/>
           <a:lstStyle/>
           <a:p>
-            <a:r>
-              <a:rPr lang="en-US" smtClean="0"/>
-              <a:t>Goals</a:t>
-            </a:r>
-          </a:p>
-          <a:p>
-            <a:r>
-              <a:rPr lang="en-US" smtClean="0"/>
-              <a:t>Results</a:t>
-            </a:r>
-            <a:endParaRPr lang="en-US" dirty="0"/>
+            <a:endParaRPr lang="pt-BR" dirty="0"/>
           </a:p>
         </p:txBody>
       </p:sp>
     </p:spTree>
     <p:extLst>
       <p:ext uri="{BB962C8B-B14F-4D97-AF65-F5344CB8AC3E}">
-        <p14:creationId xmlns:p14="http://schemas.microsoft.com/office/powerpoint/2010/main" val="2303474947"/>
+        <p14:creationId xmlns:p14="http://schemas.microsoft.com/office/powerpoint/2010/main" val="2411287200"/>
       </p:ext>
     </p:extLst>
   </p:cSld>
@@ -4473,124 +4570,10 @@
       </p:transition>
     </mc:Fallback>
   </mc:AlternateContent>
-  <p:timing>
-    <p:tnLst>
-      <p:par>
-        <p:cTn id="1" dur="indefinite" restart="never" nodeType="tmRoot"/>
-      </p:par>
-    </p:tnLst>
-  </p:timing>
 </p:sld>
 </file>
 
 <file path=ppt/slides/slide12.xml><?xml version="1.0" encoding="utf-8"?>
-<p:sld xmlns:a="http://schemas.openxmlformats.org/drawingml/2006/main" xmlns:r="http://schemas.openxmlformats.org/officeDocument/2006/relationships" xmlns:p="http://schemas.openxmlformats.org/presentationml/2006/main">
-  <p:cSld>
-    <p:spTree>
-      <p:nvGrpSpPr>
-        <p:cNvPr id="1" name=""/>
-        <p:cNvGrpSpPr/>
-        <p:nvPr/>
-      </p:nvGrpSpPr>
-      <p:grpSpPr>
-        <a:xfrm>
-          <a:off x="0" y="0"/>
-          <a:ext cx="0" cy="0"/>
-          <a:chOff x="0" y="0"/>
-          <a:chExt cx="0" cy="0"/>
-        </a:xfrm>
-      </p:grpSpPr>
-      <p:sp>
-        <p:nvSpPr>
-          <p:cNvPr id="2" name="Title 1"/>
-          <p:cNvSpPr>
-            <a:spLocks noGrp="1"/>
-          </p:cNvSpPr>
-          <p:nvPr>
-            <p:ph type="title"/>
-          </p:nvPr>
-        </p:nvSpPr>
-        <p:spPr/>
-        <p:txBody>
-          <a:bodyPr/>
-          <a:lstStyle/>
-          <a:p>
-            <a:r>
-              <a:rPr lang="en-US" smtClean="0"/>
-              <a:t>Goals for Next Period</a:t>
-            </a:r>
-            <a:endParaRPr lang="en-US" dirty="0"/>
-          </a:p>
-        </p:txBody>
-      </p:sp>
-      <p:sp>
-        <p:nvSpPr>
-          <p:cNvPr id="3" name="Content Placeholder 2"/>
-          <p:cNvSpPr>
-            <a:spLocks noGrp="1"/>
-          </p:cNvSpPr>
-          <p:nvPr>
-            <p:ph idx="1"/>
-          </p:nvPr>
-        </p:nvSpPr>
-        <p:spPr/>
-        <p:txBody>
-          <a:bodyPr/>
-          <a:lstStyle/>
-          <a:p>
-            <a:r>
-              <a:rPr lang="en-US" smtClean="0"/>
-              <a:t>Strategic undertakings</a:t>
-            </a:r>
-          </a:p>
-          <a:p>
-            <a:r>
-              <a:rPr lang="en-US" smtClean="0"/>
-              <a:t>Financial goals</a:t>
-            </a:r>
-          </a:p>
-          <a:p>
-            <a:r>
-              <a:rPr lang="en-US" smtClean="0"/>
-              <a:t>Other key efforts</a:t>
-            </a:r>
-            <a:endParaRPr lang="en-US" dirty="0"/>
-          </a:p>
-        </p:txBody>
-      </p:sp>
-    </p:spTree>
-    <p:extLst>
-      <p:ext uri="{BB962C8B-B14F-4D97-AF65-F5344CB8AC3E}">
-        <p14:creationId xmlns:p14="http://schemas.microsoft.com/office/powerpoint/2010/main" val="329787518"/>
-      </p:ext>
-    </p:extLst>
-  </p:cSld>
-  <p:clrMapOvr>
-    <a:masterClrMapping/>
-  </p:clrMapOvr>
-  <mc:AlternateContent xmlns:mc="http://schemas.openxmlformats.org/markup-compatibility/2006" xmlns:p14="http://schemas.microsoft.com/office/powerpoint/2010/main">
-    <mc:Choice Requires="p14">
-      <p:transition spd="med" p14:dur="700">
-        <p:fade/>
-      </p:transition>
-    </mc:Choice>
-    <mc:Fallback xmlns="">
-      <p:transition spd="med">
-        <p:fade/>
-      </p:transition>
-    </mc:Fallback>
-  </mc:AlternateContent>
-  <p:timing>
-    <p:tnLst>
-      <p:par>
-        <p:cTn id="1" dur="indefinite" restart="never" nodeType="tmRoot"/>
-      </p:par>
-    </p:tnLst>
-  </p:timing>
-</p:sld>
-</file>
-
-<file path=ppt/slides/slide13.xml><?xml version="1.0" encoding="utf-8"?>
 <p:sld xmlns:a="http://schemas.openxmlformats.org/drawingml/2006/main" xmlns:r="http://schemas.openxmlformats.org/officeDocument/2006/relationships" xmlns:p="http://schemas.openxmlformats.org/presentationml/2006/main">
   <p:cSld>
     <p:spTree>
@@ -4741,13 +4724,20 @@
           <a:bodyPr/>
           <a:lstStyle/>
           <a:p>
+            <a:endParaRPr lang="en-US" dirty="0" smtClean="0"/>
+          </a:p>
+          <a:p>
             <a:r>
               <a:rPr lang="en-US" dirty="0" err="1" smtClean="0"/>
               <a:t>Dispositivos</a:t>
             </a:r>
             <a:r>
               <a:rPr lang="en-US" dirty="0" smtClean="0"/>
-              <a:t> de </a:t>
+              <a:t> </a:t>
+            </a:r>
+            <a:r>
+              <a:rPr lang="en-US" dirty="0" smtClean="0"/>
+              <a:t>de </a:t>
             </a:r>
             <a:r>
               <a:rPr lang="en-US" dirty="0" err="1" smtClean="0"/>
@@ -4758,19 +4748,9 @@
           <a:p>
             <a:r>
               <a:rPr lang="en-US" dirty="0" smtClean="0"/>
-              <a:t>Interfaces de </a:t>
-            </a:r>
-            <a:r>
-              <a:rPr lang="en-US" dirty="0" err="1" smtClean="0"/>
-              <a:t>Conexão</a:t>
+              <a:t>RAID</a:t>
             </a:r>
             <a:endParaRPr lang="en-US" dirty="0" smtClean="0"/>
-          </a:p>
-          <a:p>
-            <a:r>
-              <a:rPr lang="en-US" dirty="0" smtClean="0"/>
-              <a:t>RAID</a:t>
-            </a:r>
           </a:p>
           <a:p>
             <a:r>
@@ -5277,179 +5257,6 @@
             <p:ph type="title"/>
           </p:nvPr>
         </p:nvSpPr>
-        <p:spPr/>
-        <p:txBody>
-          <a:bodyPr/>
-          <a:lstStyle/>
-          <a:p>
-            <a:r>
-              <a:rPr lang="en-US" dirty="0"/>
-              <a:t>Interfaces de Conexão</a:t>
-            </a:r>
-          </a:p>
-        </p:txBody>
-      </p:sp>
-      <p:sp>
-        <p:nvSpPr>
-          <p:cNvPr id="3" name="Content Placeholder 2"/>
-          <p:cNvSpPr>
-            <a:spLocks noGrp="1"/>
-          </p:cNvSpPr>
-          <p:nvPr>
-            <p:ph idx="1"/>
-          </p:nvPr>
-        </p:nvSpPr>
-        <p:spPr/>
-        <p:txBody>
-          <a:bodyPr/>
-          <a:lstStyle/>
-          <a:p>
-            <a:endParaRPr lang="en-US" dirty="0" smtClean="0"/>
-          </a:p>
-          <a:p>
-            <a:r>
-              <a:rPr lang="en-US" dirty="0" smtClean="0"/>
-              <a:t>ATA - </a:t>
-            </a:r>
-            <a:r>
-              <a:rPr lang="pt-BR" b="1" dirty="0" err="1"/>
-              <a:t>Advanced</a:t>
-            </a:r>
-            <a:r>
-              <a:rPr lang="pt-BR" b="1" dirty="0"/>
-              <a:t> Technology </a:t>
-            </a:r>
-            <a:r>
-              <a:rPr lang="pt-BR" b="1" dirty="0" err="1" smtClean="0"/>
-              <a:t>Attachment</a:t>
-            </a:r>
-            <a:endParaRPr lang="pt-BR" b="1" dirty="0" smtClean="0"/>
-          </a:p>
-          <a:p>
-            <a:r>
-              <a:rPr lang="pt-BR" b="1" dirty="0" smtClean="0"/>
-              <a:t>SATA </a:t>
-            </a:r>
-            <a:r>
-              <a:rPr lang="pt-BR" b="1" dirty="0"/>
-              <a:t>- Serial </a:t>
-            </a:r>
-            <a:r>
-              <a:rPr lang="pt-BR" b="1" dirty="0" err="1"/>
-              <a:t>Advanced</a:t>
-            </a:r>
-            <a:r>
-              <a:rPr lang="pt-BR" b="1" dirty="0"/>
-              <a:t> Technology </a:t>
-            </a:r>
-            <a:r>
-              <a:rPr lang="pt-BR" b="1" dirty="0" err="1" smtClean="0"/>
-              <a:t>Attachment</a:t>
-            </a:r>
-            <a:endParaRPr lang="pt-BR" b="1" dirty="0" smtClean="0"/>
-          </a:p>
-          <a:p>
-            <a:r>
-              <a:rPr lang="pt-BR" b="1" dirty="0" smtClean="0"/>
-              <a:t>SCSI - </a:t>
-            </a:r>
-            <a:r>
-              <a:rPr lang="pt-BR" b="1" dirty="0" err="1" smtClean="0"/>
-              <a:t>Small</a:t>
-            </a:r>
-            <a:r>
-              <a:rPr lang="pt-BR" b="1" dirty="0" smtClean="0"/>
-              <a:t> </a:t>
-            </a:r>
-            <a:r>
-              <a:rPr lang="pt-BR" b="1" dirty="0"/>
-              <a:t>Computer Systems </a:t>
-            </a:r>
-            <a:r>
-              <a:rPr lang="pt-BR" b="1" dirty="0" smtClean="0"/>
-              <a:t>Interface</a:t>
-            </a:r>
-          </a:p>
-          <a:p>
-            <a:r>
-              <a:rPr lang="pt-BR" b="1" dirty="0" smtClean="0"/>
-              <a:t>FC - </a:t>
-            </a:r>
-            <a:r>
-              <a:rPr lang="pt-BR" b="1" dirty="0" err="1" smtClean="0"/>
-              <a:t>Fibre</a:t>
-            </a:r>
-            <a:r>
-              <a:rPr lang="pt-BR" b="1" dirty="0" smtClean="0"/>
-              <a:t> </a:t>
-            </a:r>
-            <a:r>
-              <a:rPr lang="pt-BR" b="1" dirty="0" err="1" smtClean="0"/>
-              <a:t>Channel</a:t>
-            </a:r>
-            <a:endParaRPr lang="pt-BR" dirty="0"/>
-          </a:p>
-        </p:txBody>
-      </p:sp>
-    </p:spTree>
-    <p:extLst>
-      <p:ext uri="{BB962C8B-B14F-4D97-AF65-F5344CB8AC3E}">
-        <p14:creationId xmlns:p14="http://schemas.microsoft.com/office/powerpoint/2010/main" val="1794587301"/>
-      </p:ext>
-    </p:extLst>
-  </p:cSld>
-  <p:clrMapOvr>
-    <a:masterClrMapping/>
-  </p:clrMapOvr>
-  <mc:AlternateContent xmlns:mc="http://schemas.openxmlformats.org/markup-compatibility/2006" xmlns:p14="http://schemas.microsoft.com/office/powerpoint/2010/main">
-    <mc:Choice Requires="p14">
-      <p:transition spd="med" p14:dur="700">
-        <p:fade/>
-      </p:transition>
-    </mc:Choice>
-    <mc:Fallback xmlns="">
-      <p:transition spd="med">
-        <p:fade/>
-      </p:transition>
-    </mc:Fallback>
-  </mc:AlternateContent>
-  <p:timing>
-    <p:tnLst>
-      <p:par>
-        <p:cTn id="1" dur="indefinite" restart="never" nodeType="tmRoot"/>
-      </p:par>
-    </p:tnLst>
-  </p:timing>
-</p:sld>
-</file>
-
-<file path=ppt/slides/slide6.xml><?xml version="1.0" encoding="utf-8"?>
-<p:sld xmlns:a="http://schemas.openxmlformats.org/drawingml/2006/main" xmlns:r="http://schemas.openxmlformats.org/officeDocument/2006/relationships" xmlns:p="http://schemas.openxmlformats.org/presentationml/2006/main">
-  <p:cSld>
-    <p:spTree>
-      <p:nvGrpSpPr>
-        <p:cNvPr id="1" name=""/>
-        <p:cNvGrpSpPr/>
-        <p:nvPr/>
-      </p:nvGrpSpPr>
-      <p:grpSpPr>
-        <a:xfrm>
-          <a:off x="0" y="0"/>
-          <a:ext cx="0" cy="0"/>
-          <a:chOff x="0" y="0"/>
-          <a:chExt cx="0" cy="0"/>
-        </a:xfrm>
-      </p:grpSpPr>
-      <p:sp>
-        <p:nvSpPr>
-          <p:cNvPr id="2" name="Title 1"/>
-          <p:cNvSpPr>
-            <a:spLocks noGrp="1"/>
-          </p:cNvSpPr>
-          <p:nvPr>
-            <p:ph type="title"/>
-          </p:nvPr>
-        </p:nvSpPr>
         <p:spPr>
           <a:xfrm>
             <a:off x="0" y="-122831"/>
@@ -5536,7 +5343,6 @@
               <a:rPr lang="en-US" dirty="0" smtClean="0"/>
               <a:t>RAID 0</a:t>
             </a:r>
-            <a:endParaRPr lang="en-US" dirty="0" smtClean="0"/>
           </a:p>
           <a:p>
             <a:r>
@@ -5635,7 +5441,7 @@
 </p:sld>
 </file>
 
-<file path=ppt/slides/slide7.xml><?xml version="1.0" encoding="utf-8"?>
+<file path=ppt/slides/slide6.xml><?xml version="1.0" encoding="utf-8"?>
 <p:sld xmlns:a="http://schemas.openxmlformats.org/drawingml/2006/main" xmlns:r="http://schemas.openxmlformats.org/officeDocument/2006/relationships" xmlns:p="http://schemas.openxmlformats.org/presentationml/2006/main">
   <p:cSld>
     <p:spTree>
@@ -5873,7 +5679,7 @@
 </p:sld>
 </file>
 
-<file path=ppt/slides/slide8.xml><?xml version="1.0" encoding="utf-8"?>
+<file path=ppt/slides/slide7.xml><?xml version="1.0" encoding="utf-8"?>
 <p:sld xmlns:a="http://schemas.openxmlformats.org/drawingml/2006/main" xmlns:r="http://schemas.openxmlformats.org/officeDocument/2006/relationships" xmlns:p="http://schemas.openxmlformats.org/presentationml/2006/main">
   <p:cSld>
     <p:spTree>
@@ -6169,6 +5975,172 @@
 </p:sld>
 </file>
 
+<file path=ppt/slides/slide8.xml><?xml version="1.0" encoding="utf-8"?>
+<p:sld xmlns:a="http://schemas.openxmlformats.org/drawingml/2006/main" xmlns:r="http://schemas.openxmlformats.org/officeDocument/2006/relationships" xmlns:p="http://schemas.openxmlformats.org/presentationml/2006/main">
+  <p:cSld>
+    <p:spTree>
+      <p:nvGrpSpPr>
+        <p:cNvPr id="1" name=""/>
+        <p:cNvGrpSpPr/>
+        <p:nvPr/>
+      </p:nvGrpSpPr>
+      <p:grpSpPr>
+        <a:xfrm>
+          <a:off x="0" y="0"/>
+          <a:ext cx="0" cy="0"/>
+          <a:chOff x="0" y="0"/>
+          <a:chExt cx="0" cy="0"/>
+        </a:xfrm>
+      </p:grpSpPr>
+      <p:sp>
+        <p:nvSpPr>
+          <p:cNvPr id="2" name="Title 1"/>
+          <p:cNvSpPr>
+            <a:spLocks noGrp="1"/>
+          </p:cNvSpPr>
+          <p:nvPr>
+            <p:ph type="title"/>
+          </p:nvPr>
+        </p:nvSpPr>
+        <p:spPr/>
+        <p:txBody>
+          <a:bodyPr/>
+          <a:lstStyle/>
+          <a:p>
+            <a:r>
+              <a:rPr lang="en-US" dirty="0" smtClean="0"/>
+              <a:t>SAN – “Storage Area Network”</a:t>
+            </a:r>
+            <a:endParaRPr lang="en-US" dirty="0"/>
+          </a:p>
+        </p:txBody>
+      </p:sp>
+      <p:sp>
+        <p:nvSpPr>
+          <p:cNvPr id="3" name="Content Placeholder 2"/>
+          <p:cNvSpPr>
+            <a:spLocks noGrp="1"/>
+          </p:cNvSpPr>
+          <p:nvPr>
+            <p:ph idx="1"/>
+          </p:nvPr>
+        </p:nvSpPr>
+        <p:spPr/>
+        <p:txBody>
+          <a:bodyPr/>
+          <a:lstStyle/>
+          <a:p>
+            <a:endParaRPr lang="en-US" dirty="0" smtClean="0"/>
+          </a:p>
+          <a:p>
+            <a:r>
+              <a:rPr lang="pt-BR" dirty="0" smtClean="0"/>
+              <a:t>Conectar </a:t>
+            </a:r>
+            <a:r>
+              <a:rPr lang="pt-BR" dirty="0"/>
+              <a:t>dispositivos de armazenamento de dados remotos a </a:t>
+            </a:r>
+            <a:r>
+              <a:rPr lang="pt-BR" dirty="0" smtClean="0"/>
+              <a:t>servidores</a:t>
+            </a:r>
+          </a:p>
+          <a:p>
+            <a:r>
+              <a:rPr lang="pt-BR" dirty="0" smtClean="0"/>
+              <a:t>Confiabilidade e performance em aplicações críticas</a:t>
+            </a:r>
+          </a:p>
+          <a:p>
+            <a:r>
+              <a:rPr lang="pt-BR" dirty="0"/>
+              <a:t>A </a:t>
+            </a:r>
+            <a:r>
+              <a:rPr lang="pt-BR" dirty="0" smtClean="0"/>
+              <a:t>facilidade de expansão</a:t>
+            </a:r>
+          </a:p>
+          <a:p>
+            <a:r>
+              <a:rPr lang="pt-BR" dirty="0" smtClean="0"/>
+              <a:t>Recuperação de dados e alta disponibilidade</a:t>
+            </a:r>
+          </a:p>
+          <a:p>
+            <a:r>
+              <a:rPr lang="pt-BR" dirty="0" smtClean="0"/>
+              <a:t>Preço elevado de implantação e gestão</a:t>
+            </a:r>
+          </a:p>
+          <a:p>
+            <a:endParaRPr lang="pt-BR" dirty="0"/>
+          </a:p>
+        </p:txBody>
+      </p:sp>
+      <p:pic>
+        <p:nvPicPr>
+          <p:cNvPr id="4" name="Picture 3"/>
+          <p:cNvPicPr>
+            <a:picLocks noChangeAspect="1"/>
+          </p:cNvPicPr>
+          <p:nvPr/>
+        </p:nvPicPr>
+        <p:blipFill>
+          <a:blip r:embed="rId2">
+            <a:extLst>
+              <a:ext uri="{28A0092B-C50C-407E-A947-70E740481C1C}">
+                <a14:useLocalDpi xmlns:a14="http://schemas.microsoft.com/office/drawing/2010/main" val="0"/>
+              </a:ext>
+            </a:extLst>
+          </a:blip>
+          <a:stretch>
+            <a:fillRect/>
+          </a:stretch>
+        </p:blipFill>
+        <p:spPr>
+          <a:xfrm>
+            <a:off x="7234439" y="2924573"/>
+            <a:ext cx="4347961" cy="3690989"/>
+          </a:xfrm>
+          <a:prstGeom prst="rect">
+            <a:avLst/>
+          </a:prstGeom>
+        </p:spPr>
+      </p:pic>
+    </p:spTree>
+    <p:extLst>
+      <p:ext uri="{BB962C8B-B14F-4D97-AF65-F5344CB8AC3E}">
+        <p14:creationId xmlns:p14="http://schemas.microsoft.com/office/powerpoint/2010/main" val="3801660654"/>
+      </p:ext>
+    </p:extLst>
+  </p:cSld>
+  <p:clrMapOvr>
+    <a:masterClrMapping/>
+  </p:clrMapOvr>
+  <mc:AlternateContent xmlns:mc="http://schemas.openxmlformats.org/markup-compatibility/2006" xmlns:p14="http://schemas.microsoft.com/office/powerpoint/2010/main">
+    <mc:Choice Requires="p14">
+      <p:transition spd="med" p14:dur="700">
+        <p:fade/>
+      </p:transition>
+    </mc:Choice>
+    <mc:Fallback xmlns="">
+      <p:transition spd="med">
+        <p:fade/>
+      </p:transition>
+    </mc:Fallback>
+  </mc:AlternateContent>
+  <p:timing>
+    <p:tnLst>
+      <p:par>
+        <p:cTn id="1" dur="indefinite" restart="never" nodeType="tmRoot"/>
+      </p:par>
+    </p:tnLst>
+  </p:timing>
+</p:sld>
+</file>
+
 <file path=ppt/slides/slide9.xml><?xml version="1.0" encoding="utf-8"?>
 <p:sld xmlns:a="http://schemas.openxmlformats.org/drawingml/2006/main" xmlns:r="http://schemas.openxmlformats.org/officeDocument/2006/relationships" xmlns:p="http://schemas.openxmlformats.org/presentationml/2006/main">
   <p:cSld>
@@ -6203,7 +6175,23 @@
           <a:p>
             <a:r>
               <a:rPr lang="en-US" dirty="0" smtClean="0"/>
-              <a:t>SAN – “Storage Area Network”</a:t>
+              <a:t>NAS – “Network </a:t>
+            </a:r>
+            <a:r>
+              <a:rPr lang="en-US" dirty="0" err="1" smtClean="0"/>
+              <a:t>Attache</a:t>
+            </a:r>
+            <a:r>
+              <a:rPr lang="pt-BR" dirty="0" smtClean="0"/>
+              <a:t>d </a:t>
+            </a:r>
+            <a:r>
+              <a:rPr lang="pt-BR" dirty="0" err="1" smtClean="0"/>
+              <a:t>Storage</a:t>
+            </a:r>
+            <a:r>
+              <a:rPr lang="pt-BR" dirty="0" smtClean="0"/>
+              <a:t>”</a:t>
             </a:r>
             <a:endParaRPr lang="en-US" dirty="0"/>
           </a:p>
@@ -6229,7 +6217,7 @@
           <a:p>
             <a:r>
               <a:rPr lang="en-US" dirty="0" err="1" smtClean="0"/>
-              <a:t>Conectar</a:t>
+              <a:t>Foco</a:t>
             </a:r>
             <a:r>
               <a:rPr lang="en-US" dirty="0" smtClean="0"/>
@@ -6237,74 +6225,118 @@
             </a:r>
             <a:r>
               <a:rPr lang="en-US" dirty="0" err="1" smtClean="0"/>
-              <a:t>dispositivos</a:t>
-            </a:r>
-            <a:r>
-              <a:rPr lang="en-US" dirty="0" smtClean="0"/>
-              <a:t> </a:t>
-            </a:r>
-            <a:r>
-              <a:rPr lang="en-US" dirty="0" err="1" smtClean="0"/>
-              <a:t>na</a:t>
+              <a:t>em</a:t>
             </a:r>
             <a:r>
               <a:rPr lang="en-US" dirty="0"/>
               <a:t> </a:t>
             </a:r>
             <a:r>
-              <a:rPr lang="en-US" dirty="0" err="1" smtClean="0"/>
-              <a:t>rede</a:t>
-            </a:r>
+              <a:rPr lang="pt-BR" dirty="0" smtClean="0"/>
+              <a:t>disponibilidade </a:t>
+            </a:r>
+            <a:r>
+              <a:rPr lang="pt-BR" dirty="0"/>
+              <a:t>dos dados </a:t>
+            </a:r>
+            <a:r>
+              <a:rPr lang="pt-BR" dirty="0" smtClean="0"/>
+              <a:t>aos </a:t>
+            </a:r>
+            <a:r>
+              <a:rPr lang="pt-BR" dirty="0"/>
+              <a:t>seus </a:t>
+            </a:r>
+            <a:r>
+              <a:rPr lang="pt-BR" dirty="0" smtClean="0"/>
+              <a:t>Colaboradores</a:t>
+            </a:r>
+          </a:p>
+          <a:p>
+            <a:r>
+              <a:rPr lang="en-US" dirty="0" smtClean="0"/>
+              <a:t>Sistema complete </a:t>
+            </a:r>
+            <a:r>
+              <a:rPr lang="pt-BR" dirty="0" smtClean="0"/>
+              <a:t>por </a:t>
+            </a:r>
+            <a:r>
+              <a:rPr lang="pt-BR" dirty="0"/>
+              <a:t>apresentar um servidor de arquivos </a:t>
+            </a:r>
+          </a:p>
+          <a:p>
+            <a:r>
+              <a:rPr lang="pt-BR" dirty="0" smtClean="0"/>
+              <a:t>Baixo </a:t>
+            </a:r>
+            <a:r>
+              <a:rPr lang="pt-BR" dirty="0"/>
+              <a:t>custo de implementação e de gestão do sistema. </a:t>
+            </a:r>
+            <a:endParaRPr lang="pt-BR" dirty="0" smtClean="0"/>
+          </a:p>
+          <a:p>
+            <a:r>
+              <a:rPr lang="pt-BR" dirty="0" smtClean="0"/>
+              <a:t>Limitada </a:t>
+            </a:r>
+            <a:r>
+              <a:rPr lang="pt-BR" dirty="0"/>
+              <a:t>pelo </a:t>
+            </a:r>
+            <a:r>
+              <a:rPr lang="pt-BR" dirty="0" smtClean="0"/>
+              <a:t>hardware</a:t>
+            </a:r>
+            <a:endParaRPr lang="pt-BR" dirty="0"/>
+          </a:p>
+          <a:p>
+            <a:endParaRPr lang="pt-BR" dirty="0"/>
+          </a:p>
+          <a:p>
+            <a:endParaRPr lang="pt-BR" dirty="0"/>
+          </a:p>
+          <a:p>
             <a:endParaRPr lang="en-US" dirty="0" smtClean="0"/>
           </a:p>
-          <a:p>
-            <a:r>
-              <a:rPr lang="pt-BR" dirty="0" smtClean="0"/>
-              <a:t>Usa </a:t>
-            </a:r>
-            <a:r>
-              <a:rPr lang="pt-BR" dirty="0"/>
-              <a:t>preferencialmente a fibra </a:t>
-            </a:r>
-            <a:r>
-              <a:rPr lang="pt-BR" dirty="0" smtClean="0"/>
-              <a:t>ótica</a:t>
-            </a:r>
-            <a:endParaRPr lang="en-US" dirty="0" smtClean="0"/>
-          </a:p>
-          <a:p>
-            <a:pPr lvl="1"/>
-            <a:r>
-              <a:rPr lang="pt-BR" dirty="0" smtClean="0">
-                <a:solidFill>
-                  <a:srgbClr val="FF0000"/>
-                </a:solidFill>
-              </a:rPr>
-              <a:t>conectar </a:t>
-            </a:r>
-            <a:r>
-              <a:rPr lang="pt-BR" dirty="0">
-                <a:solidFill>
-                  <a:srgbClr val="FF0000"/>
-                </a:solidFill>
-              </a:rPr>
-              <a:t>dispositivos de armazenamento de dados remotos a servidores, de maneira que aparentam que os dispositivos estão ligados fisicamente ao </a:t>
-            </a:r>
-            <a:r>
-              <a:rPr lang="pt-BR" dirty="0" smtClean="0">
-                <a:solidFill>
-                  <a:srgbClr val="FF0000"/>
-                </a:solidFill>
-              </a:rPr>
-              <a:t>servidor</a:t>
-            </a:r>
-          </a:p>
-        </p:txBody>
-      </p:sp>
+        </p:txBody>
+      </p:sp>
+      <p:pic>
+        <p:nvPicPr>
+          <p:cNvPr id="4" name="Picture 3"/>
+          <p:cNvPicPr>
+            <a:picLocks noChangeAspect="1"/>
+          </p:cNvPicPr>
+          <p:nvPr/>
+        </p:nvPicPr>
+        <p:blipFill>
+          <a:blip r:embed="rId2">
+            <a:extLst>
+              <a:ext uri="{28A0092B-C50C-407E-A947-70E740481C1C}">
+                <a14:useLocalDpi xmlns:a14="http://schemas.microsoft.com/office/drawing/2010/main" val="0"/>
+              </a:ext>
+            </a:extLst>
+          </a:blip>
+          <a:stretch>
+            <a:fillRect/>
+          </a:stretch>
+        </p:blipFill>
+        <p:spPr>
+          <a:xfrm>
+            <a:off x="7008898" y="3396671"/>
+            <a:ext cx="3517434" cy="3064341"/>
+          </a:xfrm>
+          <a:prstGeom prst="rect">
+            <a:avLst/>
+          </a:prstGeom>
+        </p:spPr>
+      </p:pic>
     </p:spTree>
     <p:extLst>
       <p:ext uri="{BB962C8B-B14F-4D97-AF65-F5344CB8AC3E}">
-        <p14:creationId xmlns:p14="http://schemas.microsoft.com/office/powerpoint/2010/main" val="3801660654"/>
+        <p14:creationId xmlns:p14="http://schemas.microsoft.com/office/powerpoint/2010/main" val="2519909124"/>
       </p:ext>
     </p:extLst>
   </p:cSld>

</xml_diff>